<commit_message>
OD: Added presentation pdf
</commit_message>
<xml_diff>
--- a/QA Cinema-Documentation/Presentation/QACinema.pptx
+++ b/QA Cinema-Documentation/Presentation/QACinema.pptx
@@ -381,7 +381,7 @@
           <a:p>
             <a:fld id="{17E051C0-52B0-4E3C-A780-E78E876D14C3}" type="datetimeFigureOut">
               <a:rPr lang="en-GB" smtClean="0"/>
-              <a:t>15/07/2021</a:t>
+              <a:t>16/07/2021</a:t>
             </a:fld>
             <a:endParaRPr lang="en-GB"/>
           </a:p>
@@ -589,7 +589,7 @@
           <a:p>
             <a:fld id="{17E051C0-52B0-4E3C-A780-E78E876D14C3}" type="datetimeFigureOut">
               <a:rPr lang="en-GB" smtClean="0"/>
-              <a:t>15/07/2021</a:t>
+              <a:t>16/07/2021</a:t>
             </a:fld>
             <a:endParaRPr lang="en-GB"/>
           </a:p>
@@ -845,7 +845,7 @@
           <a:p>
             <a:fld id="{17E051C0-52B0-4E3C-A780-E78E876D14C3}" type="datetimeFigureOut">
               <a:rPr lang="en-GB" smtClean="0"/>
-              <a:t>15/07/2021</a:t>
+              <a:t>16/07/2021</a:t>
             </a:fld>
             <a:endParaRPr lang="en-GB"/>
           </a:p>
@@ -1019,7 +1019,7 @@
           <a:p>
             <a:fld id="{17E051C0-52B0-4E3C-A780-E78E876D14C3}" type="datetimeFigureOut">
               <a:rPr lang="en-GB" smtClean="0"/>
-              <a:t>15/07/2021</a:t>
+              <a:t>16/07/2021</a:t>
             </a:fld>
             <a:endParaRPr lang="en-GB"/>
           </a:p>
@@ -1362,7 +1362,7 @@
           <a:p>
             <a:fld id="{17E051C0-52B0-4E3C-A780-E78E876D14C3}" type="datetimeFigureOut">
               <a:rPr lang="en-GB" smtClean="0"/>
-              <a:t>15/07/2021</a:t>
+              <a:t>16/07/2021</a:t>
             </a:fld>
             <a:endParaRPr lang="en-GB"/>
           </a:p>
@@ -1637,7 +1637,7 @@
           <a:p>
             <a:fld id="{17E051C0-52B0-4E3C-A780-E78E876D14C3}" type="datetimeFigureOut">
               <a:rPr lang="en-GB" smtClean="0"/>
-              <a:t>15/07/2021</a:t>
+              <a:t>16/07/2021</a:t>
             </a:fld>
             <a:endParaRPr lang="en-GB"/>
           </a:p>
@@ -2016,7 +2016,7 @@
           <a:p>
             <a:fld id="{17E051C0-52B0-4E3C-A780-E78E876D14C3}" type="datetimeFigureOut">
               <a:rPr lang="en-GB" smtClean="0"/>
-              <a:t>15/07/2021</a:t>
+              <a:t>16/07/2021</a:t>
             </a:fld>
             <a:endParaRPr lang="en-GB"/>
           </a:p>
@@ -2134,7 +2134,7 @@
           <a:p>
             <a:fld id="{17E051C0-52B0-4E3C-A780-E78E876D14C3}" type="datetimeFigureOut">
               <a:rPr lang="en-GB" smtClean="0"/>
-              <a:t>15/07/2021</a:t>
+              <a:t>16/07/2021</a:t>
             </a:fld>
             <a:endParaRPr lang="en-GB"/>
           </a:p>
@@ -2305,7 +2305,7 @@
           <a:p>
             <a:fld id="{17E051C0-52B0-4E3C-A780-E78E876D14C3}" type="datetimeFigureOut">
               <a:rPr lang="en-GB" smtClean="0"/>
-              <a:t>15/07/2021</a:t>
+              <a:t>16/07/2021</a:t>
             </a:fld>
             <a:endParaRPr lang="en-GB"/>
           </a:p>
@@ -2659,7 +2659,7 @@
           <a:p>
             <a:fld id="{17E051C0-52B0-4E3C-A780-E78E876D14C3}" type="datetimeFigureOut">
               <a:rPr lang="en-GB" smtClean="0"/>
-              <a:t>15/07/2021</a:t>
+              <a:t>16/07/2021</a:t>
             </a:fld>
             <a:endParaRPr lang="en-GB"/>
           </a:p>
@@ -3041,7 +3041,7 @@
           <a:p>
             <a:fld id="{17E051C0-52B0-4E3C-A780-E78E876D14C3}" type="datetimeFigureOut">
               <a:rPr lang="en-GB" smtClean="0"/>
-              <a:t>15/07/2021</a:t>
+              <a:t>16/07/2021</a:t>
             </a:fld>
             <a:endParaRPr lang="en-GB"/>
           </a:p>
@@ -3328,7 +3328,7 @@
           <a:p>
             <a:fld id="{17E051C0-52B0-4E3C-A780-E78E876D14C3}" type="datetimeFigureOut">
               <a:rPr lang="en-GB" smtClean="0"/>
-              <a:t>15/07/2021</a:t>
+              <a:t>16/07/2021</a:t>
             </a:fld>
             <a:endParaRPr lang="en-GB"/>
           </a:p>
@@ -4002,8 +4002,74 @@
               <a:t>Demonstration of the project</a:t>
             </a:r>
           </a:p>
-        </p:txBody>
-      </p:sp>
+          <a:p>
+            <a:endParaRPr lang="en-GB" dirty="0"/>
+          </a:p>
+          <a:p>
+            <a:endParaRPr lang="en-GB" dirty="0"/>
+          </a:p>
+        </p:txBody>
+      </p:sp>
+      <p:pic>
+        <p:nvPicPr>
+          <p:cNvPr id="7" name="Picture 6">
+            <a:extLst>
+              <a:ext uri="{FF2B5EF4-FFF2-40B4-BE49-F238E27FC236}">
+                <a16:creationId xmlns:a16="http://schemas.microsoft.com/office/drawing/2014/main" id="{B5D14184-5025-426D-907E-DF01D3E982B7}"/>
+              </a:ext>
+            </a:extLst>
+          </p:cNvPr>
+          <p:cNvPicPr>
+            <a:picLocks noChangeAspect="1"/>
+          </p:cNvPicPr>
+          <p:nvPr/>
+        </p:nvPicPr>
+        <p:blipFill>
+          <a:blip r:embed="rId2"/>
+          <a:stretch>
+            <a:fillRect/>
+          </a:stretch>
+        </p:blipFill>
+        <p:spPr>
+          <a:xfrm>
+            <a:off x="1155247" y="2531609"/>
+            <a:ext cx="3562350" cy="962025"/>
+          </a:xfrm>
+          <a:prstGeom prst="rect">
+            <a:avLst/>
+          </a:prstGeom>
+        </p:spPr>
+      </p:pic>
+      <p:pic>
+        <p:nvPicPr>
+          <p:cNvPr id="9" name="Picture 8">
+            <a:extLst>
+              <a:ext uri="{FF2B5EF4-FFF2-40B4-BE49-F238E27FC236}">
+                <a16:creationId xmlns:a16="http://schemas.microsoft.com/office/drawing/2014/main" id="{B6C237E1-25B8-4F47-8DBB-4DC2F8E2135F}"/>
+              </a:ext>
+            </a:extLst>
+          </p:cNvPr>
+          <p:cNvPicPr>
+            <a:picLocks noChangeAspect="1"/>
+          </p:cNvPicPr>
+          <p:nvPr/>
+        </p:nvPicPr>
+        <p:blipFill>
+          <a:blip r:embed="rId3"/>
+          <a:stretch>
+            <a:fillRect/>
+          </a:stretch>
+        </p:blipFill>
+        <p:spPr>
+          <a:xfrm>
+            <a:off x="6169751" y="2533650"/>
+            <a:ext cx="3533775" cy="895350"/>
+          </a:xfrm>
+          <a:prstGeom prst="rect">
+            <a:avLst/>
+          </a:prstGeom>
+        </p:spPr>
+      </p:pic>
     </p:spTree>
     <p:extLst>
       <p:ext uri="{BB962C8B-B14F-4D97-AF65-F5344CB8AC3E}">
@@ -4034,6 +4100,42 @@
           <a:chExt cx="0" cy="0"/>
         </a:xfrm>
       </p:grpSpPr>
+      <p:pic>
+        <p:nvPicPr>
+          <p:cNvPr id="4" name="Picture 3">
+            <a:extLst>
+              <a:ext uri="{FF2B5EF4-FFF2-40B4-BE49-F238E27FC236}">
+                <a16:creationId xmlns:a16="http://schemas.microsoft.com/office/drawing/2014/main" id="{13490037-E992-49A9-8B9A-ED9FE21D21BC}"/>
+              </a:ext>
+            </a:extLst>
+          </p:cNvPr>
+          <p:cNvPicPr>
+            <a:picLocks noChangeAspect="1"/>
+          </p:cNvPicPr>
+          <p:nvPr/>
+        </p:nvPicPr>
+        <p:blipFill>
+          <a:blip r:embed="rId2">
+            <a:extLst>
+              <a:ext uri="{28A0092B-C50C-407E-A947-70E740481C1C}">
+                <a14:useLocalDpi xmlns:a14="http://schemas.microsoft.com/office/drawing/2010/main" val="0"/>
+              </a:ext>
+            </a:extLst>
+          </a:blip>
+          <a:stretch>
+            <a:fillRect/>
+          </a:stretch>
+        </p:blipFill>
+        <p:spPr>
+          <a:xfrm>
+            <a:off x="0" y="781875"/>
+            <a:ext cx="12192000" cy="5865749"/>
+          </a:xfrm>
+          <a:prstGeom prst="rect">
+            <a:avLst/>
+          </a:prstGeom>
+        </p:spPr>
+      </p:pic>
       <p:sp>
         <p:nvSpPr>
           <p:cNvPr id="2" name="Title 1">
@@ -4050,7 +4152,12 @@
             <p:ph type="title"/>
           </p:nvPr>
         </p:nvSpPr>
-        <p:spPr/>
+        <p:spPr>
+          <a:xfrm>
+            <a:off x="142059" y="192152"/>
+            <a:ext cx="10058400" cy="1450757"/>
+          </a:xfrm>
+        </p:spPr>
         <p:txBody>
           <a:bodyPr/>
           <a:lstStyle/>
@@ -4824,22 +4931,14 @@
           <a:p>
             <a:r>
               <a:rPr lang="en-GB" dirty="0"/>
-              <a:t>Creating this </a:t>
-            </a:r>
-            <a:r>
-              <a:rPr lang="en-GB" dirty="0" err="1"/>
-              <a:t>Fullstack</a:t>
-            </a:r>
+              <a:t>This sprint has improved our knowledge:</a:t>
+            </a:r>
+          </a:p>
+          <a:p>
+            <a:pPr lvl="1"/>
             <a:r>
               <a:rPr lang="en-GB" dirty="0"/>
-              <a:t> MERN application has improved my knowledge:</a:t>
-            </a:r>
-          </a:p>
-          <a:p>
-            <a:pPr lvl="1"/>
-            <a:r>
-              <a:rPr lang="en-GB" dirty="0"/>
-              <a:t>Back</a:t>
+              <a:t>Front end calls to backend</a:t>
             </a:r>
           </a:p>
           <a:p>
@@ -4852,7 +4951,7 @@
           <a:p>
             <a:r>
               <a:rPr lang="en-GB" dirty="0"/>
-              <a:t>Overall the aims project have been met:</a:t>
+              <a:t>MVP met:</a:t>
             </a:r>
           </a:p>
           <a:p>
@@ -4890,7 +4989,7 @@
             <a:pPr lvl="1"/>
             <a:r>
               <a:rPr lang="en-GB" dirty="0"/>
-              <a:t>More realistic with setting time frames of each sprints</a:t>
+              <a:t>More realistic goals of each sprints</a:t>
             </a:r>
           </a:p>
           <a:p>
@@ -5071,7 +5170,7 @@
                 <a:ea typeface="Arial" panose="020B0604020202020204" pitchFamily="34" charset="0"/>
                 <a:cs typeface="Arial" panose="020B0604020202020204" pitchFamily="34" charset="0"/>
               </a:rPr>
-              <a:t>Create a full-stack web application following the Enterprise Architecture Model, using:</a:t>
+              <a:t>Create a web application following the Enterprise Architecture Model, using:</a:t>
             </a:r>
             <a:endParaRPr lang="en-GB" dirty="0">
               <a:solidFill>
@@ -5112,7 +5211,7 @@
                 <a:ea typeface="Calibri" panose="020F0502020204030204" pitchFamily="34" charset="0"/>
                 <a:cs typeface="Segoe UI" panose="020B0502040204020203" pitchFamily="34" charset="0"/>
               </a:rPr>
-              <a:t>A front-end developed using the language from your Front-End Web Technologies module (React)</a:t>
+              <a:t>A front-end written using React</a:t>
             </a:r>
           </a:p>
           <a:p>
@@ -5135,7 +5234,29 @@
                 <a:ea typeface="Calibri" panose="020F0502020204030204" pitchFamily="34" charset="0"/>
                 <a:cs typeface="Segoe UI" panose="020B0502040204020203" pitchFamily="34" charset="0"/>
               </a:rPr>
-              <a:t>Business Layer - An application back-end developed using the language from your Programming Fundamentals module (Node). Express, a web application framework for Node.js</a:t>
+              <a:t>Business Layer - An </a:t>
+            </a:r>
+            <a:r>
+              <a:rPr lang="en-GB" sz="1800" dirty="0" err="1">
+                <a:solidFill>
+                  <a:srgbClr val="000000"/>
+                </a:solidFill>
+                <a:effectLst/>
+                <a:ea typeface="Calibri" panose="020F0502020204030204" pitchFamily="34" charset="0"/>
+                <a:cs typeface="Segoe UI" panose="020B0502040204020203" pitchFamily="34" charset="0"/>
+              </a:rPr>
+              <a:t>expressJS</a:t>
+            </a:r>
+            <a:r>
+              <a:rPr lang="en-GB" sz="1800" dirty="0">
+                <a:solidFill>
+                  <a:srgbClr val="000000"/>
+                </a:solidFill>
+                <a:effectLst/>
+                <a:ea typeface="Calibri" panose="020F0502020204030204" pitchFamily="34" charset="0"/>
+                <a:cs typeface="Segoe UI" panose="020B0502040204020203" pitchFamily="34" charset="0"/>
+              </a:rPr>
+              <a:t> API</a:t>
             </a:r>
           </a:p>
           <a:p>
@@ -5158,20 +5279,8 @@
                 <a:ea typeface="Calibri" panose="020F0502020204030204" pitchFamily="34" charset="0"/>
                 <a:cs typeface="Segoe UI" panose="020B0502040204020203" pitchFamily="34" charset="0"/>
               </a:rPr>
-              <a:t>Data Layer -A managed database hosted locally or within the Cloud Provider (e.g. MySQL in GCP, MongoDB a cross-platform document-oriented database program)</a:t>
-            </a:r>
-          </a:p>
-          <a:p>
-            <a:pPr marL="342900" lvl="0" indent="-342900">
-              <a:spcBef>
-                <a:spcPts val="795"/>
-              </a:spcBef>
-              <a:buFont typeface="Symbol" panose="05050102010706020507" pitchFamily="18" charset="2"/>
-              <a:buChar char=""/>
-              <a:tabLst>
-                <a:tab pos="546100" algn="l"/>
-              </a:tabLst>
-            </a:pPr>
+              <a:t>Data Layer – A Mongo database</a:t>
+            </a:r>
             <a:endParaRPr lang="en-GB" dirty="0"/>
           </a:p>
         </p:txBody>
@@ -5374,7 +5483,7 @@
                   <a:schemeClr val="tx1"/>
                 </a:solidFill>
               </a:rPr>
-              <a:t>Key deliverables were split into user stories on a Kanban board. </a:t>
+              <a:t>Key deliverables were split into user stories. </a:t>
             </a:r>
           </a:p>
           <a:p>
@@ -5417,7 +5526,7 @@
                 <a:ea typeface="+mn-ea"/>
                 <a:cs typeface="Calibri"/>
               </a:rPr>
-              <a:t>Back-end application with full CRUD functionality </a:t>
+              <a:t>CRUD back-end </a:t>
             </a:r>
           </a:p>
           <a:p>
@@ -5926,7 +6035,40 @@
                 <a:ea typeface="Calibri" panose="020F0502020204030204" pitchFamily="34" charset="0"/>
                 <a:cs typeface="Segoe UI" panose="020B0502040204020203" pitchFamily="34" charset="0"/>
               </a:rPr>
-              <a:t>Version Control System: Git – Project management. </a:t>
+              <a:t>Version Control </a:t>
+            </a:r>
+            <a:r>
+              <a:rPr lang="en-GB" dirty="0" err="1">
+                <a:solidFill>
+                  <a:srgbClr val="404040"/>
+                </a:solidFill>
+                <a:effectLst/>
+                <a:ea typeface="Calibri" panose="020F0502020204030204" pitchFamily="34" charset="0"/>
+                <a:cs typeface="Segoe UI" panose="020B0502040204020203" pitchFamily="34" charset="0"/>
+              </a:rPr>
+              <a:t>System:Git</a:t>
+            </a:r>
+            <a:r>
+              <a:rPr lang="en-GB" dirty="0">
+                <a:solidFill>
+                  <a:srgbClr val="404040"/>
+                </a:solidFill>
+                <a:effectLst/>
+                <a:ea typeface="Calibri" panose="020F0502020204030204" pitchFamily="34" charset="0"/>
+                <a:cs typeface="Segoe UI" panose="020B0502040204020203" pitchFamily="34" charset="0"/>
+              </a:rPr>
+              <a:t>, </a:t>
+            </a:r>
+            <a:r>
+              <a:rPr lang="en-GB" dirty="0" err="1">
+                <a:solidFill>
+                  <a:srgbClr val="404040"/>
+                </a:solidFill>
+                <a:effectLst/>
+                <a:ea typeface="Calibri" panose="020F0502020204030204" pitchFamily="34" charset="0"/>
+                <a:cs typeface="Segoe UI" panose="020B0502040204020203" pitchFamily="34" charset="0"/>
+              </a:rPr>
+              <a:t>Github</a:t>
             </a:r>
             <a:r>
               <a:rPr lang="en-GB" dirty="0">
@@ -5936,7 +6078,7 @@
                 <a:ea typeface="Calibri" panose="020F0502020204030204" pitchFamily="34" charset="0"/>
                 <a:cs typeface="Segoe UI" panose="020B0502040204020203" pitchFamily="34" charset="0"/>
               </a:rPr>
-              <a:t>Pushing and Reverting.</a:t>
+              <a:t>.</a:t>
             </a:r>
             <a:endParaRPr lang="en-GB" dirty="0">
               <a:solidFill>
@@ -5953,63 +6095,8 @@
               <a:buChar char="•"/>
             </a:pPr>
             <a:r>
-              <a:rPr lang="en-GB" dirty="0">
-                <a:solidFill>
-                  <a:srgbClr val="404040"/>
-                </a:solidFill>
-                <a:effectLst/>
-                <a:ea typeface="Calibri" panose="020F0502020204030204" pitchFamily="34" charset="0"/>
-                <a:cs typeface="Segoe UI" panose="020B0502040204020203" pitchFamily="34" charset="0"/>
-              </a:rPr>
-              <a:t>Source Code Management: GitHub. </a:t>
-            </a:r>
-            <a:r>
-              <a:rPr lang="en-GB" dirty="0">
-                <a:solidFill>
-                  <a:srgbClr val="404040"/>
-                </a:solidFill>
-                <a:ea typeface="Calibri" panose="020F0502020204030204" pitchFamily="34" charset="0"/>
-                <a:cs typeface="Segoe UI" panose="020B0502040204020203" pitchFamily="34" charset="0"/>
-              </a:rPr>
-              <a:t>See the progress of the project coming together.</a:t>
-            </a:r>
-            <a:endParaRPr lang="en-GB" dirty="0">
-              <a:solidFill>
-                <a:srgbClr val="404040"/>
-              </a:solidFill>
-              <a:effectLst/>
-              <a:ea typeface="Calibri" panose="020F0502020204030204" pitchFamily="34" charset="0"/>
-              <a:cs typeface="Segoe UI" panose="020B0502040204020203" pitchFamily="34" charset="0"/>
-            </a:endParaRPr>
-          </a:p>
-          <a:p>
-            <a:pPr>
-              <a:buFont typeface="Arial" panose="020B0604020202020204" pitchFamily="34" charset="0"/>
-              <a:buChar char="•"/>
-            </a:pPr>
-            <a:r>
               <a:rPr lang="en-GB" dirty="0"/>
-              <a:t>Database management system – MongoDB, Google Cloud Platform (GCP)</a:t>
-            </a:r>
-          </a:p>
-          <a:p>
-            <a:pPr>
-              <a:buFont typeface="Arial" panose="020B0604020202020204" pitchFamily="34" charset="0"/>
-              <a:buChar char="•"/>
-            </a:pPr>
-            <a:r>
-              <a:rPr lang="en-GB" dirty="0"/>
-              <a:t>Backend API used– Express</a:t>
-            </a:r>
-          </a:p>
-          <a:p>
-            <a:pPr>
-              <a:buFont typeface="Arial" panose="020B0604020202020204" pitchFamily="34" charset="0"/>
-              <a:buChar char="•"/>
-            </a:pPr>
-            <a:r>
-              <a:rPr lang="en-GB" dirty="0"/>
-              <a:t>Frontend framework- React</a:t>
+              <a:t>MERN Stack</a:t>
             </a:r>
           </a:p>
           <a:p>
@@ -6132,7 +6219,7 @@
             </a:pPr>
             <a:r>
               <a:rPr lang="en-GB" dirty="0"/>
-              <a:t>Git for version control</a:t>
+              <a:t>Feature-branch model. (GitKraken)</a:t>
             </a:r>
           </a:p>
           <a:p>
@@ -6142,34 +6229,64 @@
             </a:pPr>
             <a:r>
               <a:rPr lang="en-GB" dirty="0"/>
-              <a:t>Used a Feature-branch model. (GitKraken)</a:t>
-            </a:r>
-          </a:p>
-          <a:p>
-            <a:pPr>
-              <a:buFont typeface="Arial" panose="020B0604020202020204" pitchFamily="34" charset="0"/>
-              <a:buChar char="•"/>
+              <a:t>Regular commits to ensure project safety.</a:t>
+            </a:r>
+          </a:p>
+          <a:p>
+            <a:pPr marL="0" indent="0">
+              <a:buNone/>
             </a:pPr>
-            <a:r>
-              <a:rPr lang="en-GB" dirty="0"/>
-              <a:t>Regular commits to ensure project safety.</a:t>
-            </a:r>
-          </a:p>
-          <a:p>
-            <a:pPr>
-              <a:buFont typeface="Arial" panose="020B0604020202020204" pitchFamily="34" charset="0"/>
-              <a:buChar char="•"/>
-            </a:pPr>
-            <a:r>
-              <a:rPr lang="en-GB" dirty="0"/>
-              <a:t>Used Jira tags on most commits.</a:t>
-            </a:r>
-          </a:p>
-          <a:p>
             <a:endParaRPr lang="en-GB" dirty="0"/>
           </a:p>
         </p:txBody>
       </p:sp>
+      <p:pic>
+        <p:nvPicPr>
+          <p:cNvPr id="4" name="Picture 4">
+            <a:extLst>
+              <a:ext uri="{FF2B5EF4-FFF2-40B4-BE49-F238E27FC236}">
+                <a16:creationId xmlns:a16="http://schemas.microsoft.com/office/drawing/2014/main" id="{EF49822C-6853-418C-9499-2631F5C9860F}"/>
+              </a:ext>
+            </a:extLst>
+          </p:cNvPr>
+          <p:cNvPicPr>
+            <a:picLocks noChangeAspect="1" noChangeArrowheads="1"/>
+          </p:cNvPicPr>
+          <p:nvPr/>
+        </p:nvPicPr>
+        <p:blipFill>
+          <a:blip r:embed="rId2">
+            <a:extLst>
+              <a:ext uri="{28A0092B-C50C-407E-A947-70E740481C1C}">
+                <a14:useLocalDpi xmlns:a14="http://schemas.microsoft.com/office/drawing/2010/main" val="0"/>
+              </a:ext>
+            </a:extLst>
+          </a:blip>
+          <a:srcRect/>
+          <a:stretch>
+            <a:fillRect/>
+          </a:stretch>
+        </p:blipFill>
+        <p:spPr bwMode="auto">
+          <a:xfrm>
+            <a:off x="7633314" y="1923792"/>
+            <a:ext cx="4052549" cy="4292450"/>
+          </a:xfrm>
+          <a:prstGeom prst="rect">
+            <a:avLst/>
+          </a:prstGeom>
+          <a:noFill/>
+          <a:extLst>
+            <a:ext uri="{909E8E84-426E-40DD-AFC4-6F175D3DCCD1}">
+              <a14:hiddenFill xmlns:a14="http://schemas.microsoft.com/office/drawing/2010/main">
+                <a:solidFill>
+                  <a:srgbClr val="FFFFFF"/>
+                </a:solidFill>
+              </a14:hiddenFill>
+            </a:ext>
+          </a:extLst>
+        </p:spPr>
+      </p:pic>
     </p:spTree>
     <p:extLst>
       <p:ext uri="{BB962C8B-B14F-4D97-AF65-F5344CB8AC3E}">

</xml_diff>